<commit_message>
Added multinomial spline fit with separate estimates of R value of B.1.1.7 and wild type
</commit_message>
<xml_diff>
--- a/plots/2021_02_09/Fig4_fit1_binomGLMM_B117_Belgium_response scale.pptx
+++ b/plots/2021_02_09/Fig4_fit1_binomGLMM_B117_Belgium_response scale.pptx
@@ -3398,378 +3398,378 @@
           </p:nvSpPr>
           <p:spPr>
             <a:xfrm>
-              <a:off x="2199579" y="1774368"/>
-              <a:ext cx="5049456" cy="4210231"/>
+              <a:off x="2199579" y="1776739"/>
+              <a:ext cx="5049456" cy="4207310"/>
             </a:xfrm>
             <a:custGeom>
               <a:avLst/>
               <a:pathLst>
-                <a:path w="5049456" h="4210231">
+                <a:path w="5049456" h="4207310">
                   <a:moveTo>
-                    <a:pt x="0" y="4143561"/>
+                    <a:pt x="0" y="4141130"/>
                   </a:moveTo>
                   <a:lnTo>
-                    <a:pt x="84157" y="4128859"/>
-                  </a:lnTo>
-                  <a:lnTo>
-                    <a:pt x="168315" y="4113047"/>
-                  </a:lnTo>
-                  <a:lnTo>
-                    <a:pt x="252472" y="4096049"/>
-                  </a:lnTo>
-                  <a:lnTo>
-                    <a:pt x="336630" y="4077785"/>
-                  </a:lnTo>
-                  <a:lnTo>
-                    <a:pt x="420788" y="4058170"/>
-                  </a:lnTo>
-                  <a:lnTo>
-                    <a:pt x="504945" y="4037115"/>
-                  </a:lnTo>
-                  <a:lnTo>
-                    <a:pt x="589103" y="4014527"/>
-                  </a:lnTo>
-                  <a:lnTo>
-                    <a:pt x="673260" y="3990307"/>
-                  </a:lnTo>
-                  <a:lnTo>
-                    <a:pt x="757418" y="3964353"/>
-                  </a:lnTo>
-                  <a:lnTo>
-                    <a:pt x="841576" y="3936555"/>
-                  </a:lnTo>
-                  <a:lnTo>
-                    <a:pt x="925733" y="3906801"/>
-                  </a:lnTo>
-                  <a:lnTo>
-                    <a:pt x="1009891" y="3874971"/>
-                  </a:lnTo>
-                  <a:lnTo>
-                    <a:pt x="1094048" y="3840940"/>
-                  </a:lnTo>
-                  <a:lnTo>
-                    <a:pt x="1178206" y="3804574"/>
-                  </a:lnTo>
-                  <a:lnTo>
-                    <a:pt x="1262364" y="3765733"/>
-                  </a:lnTo>
-                  <a:lnTo>
-                    <a:pt x="1346521" y="3724271"/>
-                  </a:lnTo>
-                  <a:lnTo>
-                    <a:pt x="1430679" y="3680031"/>
-                  </a:lnTo>
-                  <a:lnTo>
-                    <a:pt x="1514837" y="3632850"/>
-                  </a:lnTo>
-                  <a:lnTo>
-                    <a:pt x="1598994" y="3582560"/>
-                  </a:lnTo>
-                  <a:lnTo>
-                    <a:pt x="1683152" y="3528992"/>
-                  </a:lnTo>
-                  <a:lnTo>
-                    <a:pt x="1767309" y="3471977"/>
-                  </a:lnTo>
-                  <a:lnTo>
-                    <a:pt x="1851467" y="3411361"/>
-                  </a:lnTo>
-                  <a:lnTo>
-                    <a:pt x="1935625" y="3347011"/>
-                  </a:lnTo>
-                  <a:lnTo>
-                    <a:pt x="2019782" y="3278826"/>
-                  </a:lnTo>
-                  <a:lnTo>
-                    <a:pt x="2103940" y="3206747"/>
-                  </a:lnTo>
-                  <a:lnTo>
-                    <a:pt x="2188097" y="3130761"/>
-                  </a:lnTo>
-                  <a:lnTo>
-                    <a:pt x="2272255" y="3050909"/>
-                  </a:lnTo>
-                  <a:lnTo>
-                    <a:pt x="2356413" y="2967280"/>
-                  </a:lnTo>
-                  <a:lnTo>
-                    <a:pt x="2440570" y="2880014"/>
-                  </a:lnTo>
-                  <a:lnTo>
-                    <a:pt x="2524728" y="2789293"/>
-                  </a:lnTo>
-                  <a:lnTo>
-                    <a:pt x="2608886" y="2695339"/>
-                  </a:lnTo>
-                  <a:lnTo>
-                    <a:pt x="2693043" y="2598405"/>
-                  </a:lnTo>
-                  <a:lnTo>
-                    <a:pt x="2777201" y="2498776"/>
-                  </a:lnTo>
-                  <a:lnTo>
-                    <a:pt x="2861358" y="2396759"/>
-                  </a:lnTo>
-                  <a:lnTo>
-                    <a:pt x="2945516" y="2292682"/>
-                  </a:lnTo>
-                  <a:lnTo>
-                    <a:pt x="3029674" y="2186887"/>
-                  </a:lnTo>
-                  <a:lnTo>
-                    <a:pt x="3113831" y="2079730"/>
-                  </a:lnTo>
-                  <a:lnTo>
-                    <a:pt x="3197989" y="1971573"/>
-                  </a:lnTo>
-                  <a:lnTo>
-                    <a:pt x="3282146" y="1862786"/>
-                  </a:lnTo>
-                  <a:lnTo>
-                    <a:pt x="3366304" y="1753742"/>
-                  </a:lnTo>
-                  <a:lnTo>
-                    <a:pt x="3450462" y="1644811"/>
-                  </a:lnTo>
-                  <a:lnTo>
-                    <a:pt x="3534619" y="1536366"/>
-                  </a:lnTo>
-                  <a:lnTo>
-                    <a:pt x="3618777" y="1428771"/>
-                  </a:lnTo>
-                  <a:lnTo>
-                    <a:pt x="3702934" y="1322385"/>
-                  </a:lnTo>
-                  <a:lnTo>
-                    <a:pt x="3787092" y="1217556"/>
-                  </a:lnTo>
-                  <a:lnTo>
-                    <a:pt x="3871250" y="1114618"/>
-                  </a:lnTo>
-                  <a:lnTo>
-                    <a:pt x="3955407" y="1013888"/>
-                  </a:lnTo>
-                  <a:lnTo>
-                    <a:pt x="4039565" y="915663"/>
-                  </a:lnTo>
-                  <a:lnTo>
-                    <a:pt x="4123723" y="820214"/>
-                  </a:lnTo>
-                  <a:lnTo>
-                    <a:pt x="4207880" y="727786"/>
-                  </a:lnTo>
-                  <a:lnTo>
-                    <a:pt x="4292038" y="638593"/>
-                  </a:lnTo>
-                  <a:lnTo>
-                    <a:pt x="4376195" y="552816"/>
-                  </a:lnTo>
-                  <a:lnTo>
-                    <a:pt x="4460353" y="470601"/>
-                  </a:lnTo>
-                  <a:lnTo>
-                    <a:pt x="4544511" y="392061"/>
-                  </a:lnTo>
-                  <a:lnTo>
-                    <a:pt x="4628668" y="317272"/>
-                  </a:lnTo>
-                  <a:lnTo>
-                    <a:pt x="4712826" y="246277"/>
-                  </a:lnTo>
-                  <a:lnTo>
-                    <a:pt x="4796983" y="179086"/>
-                  </a:lnTo>
-                  <a:lnTo>
-                    <a:pt x="4881141" y="115679"/>
-                  </a:lnTo>
-                  <a:lnTo>
-                    <a:pt x="4965299" y="56008"/>
+                    <a:pt x="84157" y="4126430"/>
+                  </a:lnTo>
+                  <a:lnTo>
+                    <a:pt x="168315" y="4110620"/>
+                  </a:lnTo>
+                  <a:lnTo>
+                    <a:pt x="252472" y="4093626"/>
+                  </a:lnTo>
+                  <a:lnTo>
+                    <a:pt x="336630" y="4075365"/>
+                  </a:lnTo>
+                  <a:lnTo>
+                    <a:pt x="420788" y="4055754"/>
+                  </a:lnTo>
+                  <a:lnTo>
+                    <a:pt x="504945" y="4034705"/>
+                  </a:lnTo>
+                  <a:lnTo>
+                    <a:pt x="589103" y="4012122"/>
+                  </a:lnTo>
+                  <a:lnTo>
+                    <a:pt x="673260" y="3987909"/>
+                  </a:lnTo>
+                  <a:lnTo>
+                    <a:pt x="757418" y="3961962"/>
+                  </a:lnTo>
+                  <a:lnTo>
+                    <a:pt x="841576" y="3934173"/>
+                  </a:lnTo>
+                  <a:lnTo>
+                    <a:pt x="925733" y="3904429"/>
+                  </a:lnTo>
+                  <a:lnTo>
+                    <a:pt x="1009891" y="3872608"/>
+                  </a:lnTo>
+                  <a:lnTo>
+                    <a:pt x="1094048" y="3838587"/>
+                  </a:lnTo>
+                  <a:lnTo>
+                    <a:pt x="1178206" y="3802231"/>
+                  </a:lnTo>
+                  <a:lnTo>
+                    <a:pt x="1262364" y="3763401"/>
+                  </a:lnTo>
+                  <a:lnTo>
+                    <a:pt x="1346521" y="3721950"/>
+                  </a:lnTo>
+                  <a:lnTo>
+                    <a:pt x="1430679" y="3677720"/>
+                  </a:lnTo>
+                  <a:lnTo>
+                    <a:pt x="1514837" y="3630550"/>
+                  </a:lnTo>
+                  <a:lnTo>
+                    <a:pt x="1598994" y="3580272"/>
+                  </a:lnTo>
+                  <a:lnTo>
+                    <a:pt x="1683152" y="3526714"/>
+                  </a:lnTo>
+                  <a:lnTo>
+                    <a:pt x="1767309" y="3469713"/>
+                  </a:lnTo>
+                  <a:lnTo>
+                    <a:pt x="1851467" y="3409113"/>
+                  </a:lnTo>
+                  <a:lnTo>
+                    <a:pt x="1935625" y="3344783"/>
+                  </a:lnTo>
+                  <a:lnTo>
+                    <a:pt x="2019782" y="3276625"/>
+                  </a:lnTo>
+                  <a:lnTo>
+                    <a:pt x="2103940" y="3204581"/>
+                  </a:lnTo>
+                  <a:lnTo>
+                    <a:pt x="2188097" y="3128641"/>
+                  </a:lnTo>
+                  <a:lnTo>
+                    <a:pt x="2272255" y="3048844"/>
+                  </a:lnTo>
+                  <a:lnTo>
+                    <a:pt x="2356413" y="2965284"/>
+                  </a:lnTo>
+                  <a:lnTo>
+                    <a:pt x="2440570" y="2878097"/>
+                  </a:lnTo>
+                  <a:lnTo>
+                    <a:pt x="2524728" y="2787467"/>
+                  </a:lnTo>
+                  <a:lnTo>
+                    <a:pt x="2608886" y="2693612"/>
+                  </a:lnTo>
+                  <a:lnTo>
+                    <a:pt x="2693043" y="2596787"/>
+                  </a:lnTo>
+                  <a:lnTo>
+                    <a:pt x="2777201" y="2497274"/>
+                  </a:lnTo>
+                  <a:lnTo>
+                    <a:pt x="2861358" y="2395379"/>
+                  </a:lnTo>
+                  <a:lnTo>
+                    <a:pt x="2945516" y="2291427"/>
+                  </a:lnTo>
+                  <a:lnTo>
+                    <a:pt x="3029674" y="2185760"/>
+                  </a:lnTo>
+                  <a:lnTo>
+                    <a:pt x="3113831" y="2078731"/>
+                  </a:lnTo>
+                  <a:lnTo>
+                    <a:pt x="3197989" y="1970703"/>
+                  </a:lnTo>
+                  <a:lnTo>
+                    <a:pt x="3282146" y="1862043"/>
+                  </a:lnTo>
+                  <a:lnTo>
+                    <a:pt x="3366304" y="1753123"/>
+                  </a:lnTo>
+                  <a:lnTo>
+                    <a:pt x="3450462" y="1644312"/>
+                  </a:lnTo>
+                  <a:lnTo>
+                    <a:pt x="3534619" y="1535981"/>
+                  </a:lnTo>
+                  <a:lnTo>
+                    <a:pt x="3618777" y="1428495"/>
+                  </a:lnTo>
+                  <a:lnTo>
+                    <a:pt x="3702934" y="1322211"/>
+                  </a:lnTo>
+                  <a:lnTo>
+                    <a:pt x="3787092" y="1217475"/>
+                  </a:lnTo>
+                  <a:lnTo>
+                    <a:pt x="3871250" y="1114621"/>
+                  </a:lnTo>
+                  <a:lnTo>
+                    <a:pt x="3955407" y="1013965"/>
+                  </a:lnTo>
+                  <a:lnTo>
+                    <a:pt x="4039565" y="915803"/>
+                  </a:lnTo>
+                  <a:lnTo>
+                    <a:pt x="4123723" y="820407"/>
+                  </a:lnTo>
+                  <a:lnTo>
+                    <a:pt x="4207880" y="728019"/>
+                  </a:lnTo>
+                  <a:lnTo>
+                    <a:pt x="4292038" y="638853"/>
+                  </a:lnTo>
+                  <a:lnTo>
+                    <a:pt x="4376195" y="553092"/>
+                  </a:lnTo>
+                  <a:lnTo>
+                    <a:pt x="4460353" y="470880"/>
+                  </a:lnTo>
+                  <a:lnTo>
+                    <a:pt x="4544511" y="392331"/>
+                  </a:lnTo>
+                  <a:lnTo>
+                    <a:pt x="4628668" y="317522"/>
+                  </a:lnTo>
+                  <a:lnTo>
+                    <a:pt x="4712826" y="246495"/>
+                  </a:lnTo>
+                  <a:lnTo>
+                    <a:pt x="4796983" y="179263"/>
+                  </a:lnTo>
+                  <a:lnTo>
+                    <a:pt x="4881141" y="115804"/>
+                  </a:lnTo>
+                  <a:lnTo>
+                    <a:pt x="4965299" y="56074"/>
                   </a:lnTo>
                   <a:lnTo>
                     <a:pt x="5049456" y="0"/>
                   </a:lnTo>
                   <a:lnTo>
-                    <a:pt x="5049456" y="489941"/>
-                  </a:lnTo>
-                  <a:lnTo>
-                    <a:pt x="4965299" y="557757"/>
-                  </a:lnTo>
-                  <a:lnTo>
-                    <a:pt x="4881141" y="627995"/>
-                  </a:lnTo>
-                  <a:lnTo>
-                    <a:pt x="4796983" y="700584"/>
-                  </a:lnTo>
-                  <a:lnTo>
-                    <a:pt x="4712826" y="775434"/>
-                  </a:lnTo>
-                  <a:lnTo>
-                    <a:pt x="4628668" y="852441"/>
-                  </a:lnTo>
-                  <a:lnTo>
-                    <a:pt x="4544511" y="931488"/>
-                  </a:lnTo>
-                  <a:lnTo>
-                    <a:pt x="4460353" y="1012444"/>
-                  </a:lnTo>
-                  <a:lnTo>
-                    <a:pt x="4376195" y="1095166"/>
-                  </a:lnTo>
-                  <a:lnTo>
-                    <a:pt x="4292038" y="1179501"/>
-                  </a:lnTo>
-                  <a:lnTo>
-                    <a:pt x="4207880" y="1265286"/>
-                  </a:lnTo>
-                  <a:lnTo>
-                    <a:pt x="4123723" y="1352351"/>
-                  </a:lnTo>
-                  <a:lnTo>
-                    <a:pt x="4039565" y="1440516"/>
-                  </a:lnTo>
-                  <a:lnTo>
-                    <a:pt x="3955407" y="1529600"/>
-                  </a:lnTo>
-                  <a:lnTo>
-                    <a:pt x="3871250" y="1619415"/>
-                  </a:lnTo>
-                  <a:lnTo>
-                    <a:pt x="3787092" y="1709770"/>
-                  </a:lnTo>
-                  <a:lnTo>
-                    <a:pt x="3702934" y="1800472"/>
-                  </a:lnTo>
-                  <a:lnTo>
-                    <a:pt x="3618777" y="1891328"/>
-                  </a:lnTo>
-                  <a:lnTo>
-                    <a:pt x="3534619" y="1982145"/>
-                  </a:lnTo>
-                  <a:lnTo>
-                    <a:pt x="3450462" y="2072730"/>
-                  </a:lnTo>
-                  <a:lnTo>
-                    <a:pt x="3366304" y="2162891"/>
-                  </a:lnTo>
-                  <a:lnTo>
-                    <a:pt x="3282146" y="2252442"/>
-                  </a:lnTo>
-                  <a:lnTo>
-                    <a:pt x="3197989" y="2341200"/>
-                  </a:lnTo>
-                  <a:lnTo>
-                    <a:pt x="3113831" y="2428986"/>
-                  </a:lnTo>
-                  <a:lnTo>
-                    <a:pt x="3029674" y="2515630"/>
-                  </a:lnTo>
-                  <a:lnTo>
-                    <a:pt x="2945516" y="2600969"/>
-                  </a:lnTo>
-                  <a:lnTo>
-                    <a:pt x="2861358" y="2684849"/>
-                  </a:lnTo>
-                  <a:lnTo>
-                    <a:pt x="2777201" y="2767129"/>
-                  </a:lnTo>
-                  <a:lnTo>
-                    <a:pt x="2693043" y="2847679"/>
-                  </a:lnTo>
-                  <a:lnTo>
-                    <a:pt x="2608886" y="2926380"/>
-                  </a:lnTo>
-                  <a:lnTo>
-                    <a:pt x="2524728" y="3003129"/>
-                  </a:lnTo>
-                  <a:lnTo>
-                    <a:pt x="2440570" y="3077833"/>
-                  </a:lnTo>
-                  <a:lnTo>
-                    <a:pt x="2356413" y="3150411"/>
-                  </a:lnTo>
-                  <a:lnTo>
-                    <a:pt x="2272255" y="3220791"/>
-                  </a:lnTo>
-                  <a:lnTo>
-                    <a:pt x="2188097" y="3288906"/>
-                  </a:lnTo>
-                  <a:lnTo>
-                    <a:pt x="2103940" y="3354692"/>
-                  </a:lnTo>
-                  <a:lnTo>
-                    <a:pt x="2019782" y="3418082"/>
-                  </a:lnTo>
-                  <a:lnTo>
-                    <a:pt x="1935625" y="3479009"/>
-                  </a:lnTo>
-                  <a:lnTo>
-                    <a:pt x="1851467" y="3537401"/>
-                  </a:lnTo>
-                  <a:lnTo>
-                    <a:pt x="1767309" y="3593191"/>
-                  </a:lnTo>
-                  <a:lnTo>
-                    <a:pt x="1683152" y="3646318"/>
-                  </a:lnTo>
-                  <a:lnTo>
-                    <a:pt x="1598994" y="3696736"/>
-                  </a:lnTo>
-                  <a:lnTo>
-                    <a:pt x="1514837" y="3744417"/>
-                  </a:lnTo>
-                  <a:lnTo>
-                    <a:pt x="1430679" y="3789357"/>
-                  </a:lnTo>
-                  <a:lnTo>
-                    <a:pt x="1346521" y="3831578"/>
-                  </a:lnTo>
-                  <a:lnTo>
-                    <a:pt x="1262364" y="3871121"/>
-                  </a:lnTo>
-                  <a:lnTo>
-                    <a:pt x="1178206" y="3908053"/>
-                  </a:lnTo>
-                  <a:lnTo>
-                    <a:pt x="1094048" y="3942455"/>
-                  </a:lnTo>
-                  <a:lnTo>
-                    <a:pt x="1009891" y="3974424"/>
-                  </a:lnTo>
-                  <a:lnTo>
-                    <a:pt x="925733" y="4004069"/>
-                  </a:lnTo>
-                  <a:lnTo>
-                    <a:pt x="841576" y="4031503"/>
-                  </a:lnTo>
-                  <a:lnTo>
-                    <a:pt x="757418" y="4056845"/>
-                  </a:lnTo>
-                  <a:lnTo>
-                    <a:pt x="673260" y="4080218"/>
-                  </a:lnTo>
-                  <a:lnTo>
-                    <a:pt x="589103" y="4101742"/>
-                  </a:lnTo>
-                  <a:lnTo>
-                    <a:pt x="504945" y="4121537"/>
-                  </a:lnTo>
-                  <a:lnTo>
-                    <a:pt x="420788" y="4139720"/>
-                  </a:lnTo>
-                  <a:lnTo>
-                    <a:pt x="336630" y="4156404"/>
-                  </a:lnTo>
-                  <a:lnTo>
-                    <a:pt x="252472" y="4171696"/>
-                  </a:lnTo>
-                  <a:lnTo>
-                    <a:pt x="168315" y="4185700"/>
-                  </a:lnTo>
-                  <a:lnTo>
-                    <a:pt x="84157" y="4198515"/>
-                  </a:lnTo>
-                  <a:lnTo>
-                    <a:pt x="0" y="4210231"/>
+                    <a:pt x="5049456" y="488075"/>
+                  </a:lnTo>
+                  <a:lnTo>
+                    <a:pt x="4965299" y="555891"/>
+                  </a:lnTo>
+                  <a:lnTo>
+                    <a:pt x="4881141" y="626130"/>
+                  </a:lnTo>
+                  <a:lnTo>
+                    <a:pt x="4796983" y="698719"/>
+                  </a:lnTo>
+                  <a:lnTo>
+                    <a:pt x="4712826" y="773568"/>
+                  </a:lnTo>
+                  <a:lnTo>
+                    <a:pt x="4628668" y="850573"/>
+                  </a:lnTo>
+                  <a:lnTo>
+                    <a:pt x="4544511" y="929618"/>
+                  </a:lnTo>
+                  <a:lnTo>
+                    <a:pt x="4460353" y="1010572"/>
+                  </a:lnTo>
+                  <a:lnTo>
+                    <a:pt x="4376195" y="1093292"/>
+                  </a:lnTo>
+                  <a:lnTo>
+                    <a:pt x="4292038" y="1177624"/>
+                  </a:lnTo>
+                  <a:lnTo>
+                    <a:pt x="4207880" y="1263406"/>
+                  </a:lnTo>
+                  <a:lnTo>
+                    <a:pt x="4123723" y="1350466"/>
+                  </a:lnTo>
+                  <a:lnTo>
+                    <a:pt x="4039565" y="1438627"/>
+                  </a:lnTo>
+                  <a:lnTo>
+                    <a:pt x="3955407" y="1527706"/>
+                  </a:lnTo>
+                  <a:lnTo>
+                    <a:pt x="3871250" y="1617514"/>
+                  </a:lnTo>
+                  <a:lnTo>
+                    <a:pt x="3787092" y="1707861"/>
+                  </a:lnTo>
+                  <a:lnTo>
+                    <a:pt x="3702934" y="1798553"/>
+                  </a:lnTo>
+                  <a:lnTo>
+                    <a:pt x="3618777" y="1889398"/>
+                  </a:lnTo>
+                  <a:lnTo>
+                    <a:pt x="3534619" y="1980200"/>
+                  </a:lnTo>
+                  <a:lnTo>
+                    <a:pt x="3450462" y="2070768"/>
+                  </a:lnTo>
+                  <a:lnTo>
+                    <a:pt x="3366304" y="2160910"/>
+                  </a:lnTo>
+                  <a:lnTo>
+                    <a:pt x="3282146" y="2250438"/>
+                  </a:lnTo>
+                  <a:lnTo>
+                    <a:pt x="3197989" y="2339168"/>
+                  </a:lnTo>
+                  <a:lnTo>
+                    <a:pt x="3113831" y="2426924"/>
+                  </a:lnTo>
+                  <a:lnTo>
+                    <a:pt x="3029674" y="2513533"/>
+                  </a:lnTo>
+                  <a:lnTo>
+                    <a:pt x="2945516" y="2598832"/>
+                  </a:lnTo>
+                  <a:lnTo>
+                    <a:pt x="2861358" y="2682669"/>
+                  </a:lnTo>
+                  <a:lnTo>
+                    <a:pt x="2777201" y="2764901"/>
+                  </a:lnTo>
+                  <a:lnTo>
+                    <a:pt x="2693043" y="2845397"/>
+                  </a:lnTo>
+                  <a:lnTo>
+                    <a:pt x="2608886" y="2924041"/>
+                  </a:lnTo>
+                  <a:lnTo>
+                    <a:pt x="2524728" y="3000726"/>
+                  </a:lnTo>
+                  <a:lnTo>
+                    <a:pt x="2440570" y="3075363"/>
+                  </a:lnTo>
+                  <a:lnTo>
+                    <a:pt x="2356413" y="3147869"/>
+                  </a:lnTo>
+                  <a:lnTo>
+                    <a:pt x="2272255" y="3218174"/>
+                  </a:lnTo>
+                  <a:lnTo>
+                    <a:pt x="2188097" y="3286211"/>
+                  </a:lnTo>
+                  <a:lnTo>
+                    <a:pt x="2103940" y="3351917"/>
+                  </a:lnTo>
+                  <a:lnTo>
+                    <a:pt x="2019782" y="3415228"/>
+                  </a:lnTo>
+                  <a:lnTo>
+                    <a:pt x="1935625" y="3476078"/>
+                  </a:lnTo>
+                  <a:lnTo>
+                    <a:pt x="1851467" y="3534399"/>
+                  </a:lnTo>
+                  <a:lnTo>
+                    <a:pt x="1767309" y="3590124"/>
+                  </a:lnTo>
+                  <a:lnTo>
+                    <a:pt x="1683152" y="3643195"/>
+                  </a:lnTo>
+                  <a:lnTo>
+                    <a:pt x="1598994" y="3693566"/>
+                  </a:lnTo>
+                  <a:lnTo>
+                    <a:pt x="1514837" y="3741210"/>
+                  </a:lnTo>
+                  <a:lnTo>
+                    <a:pt x="1430679" y="3786123"/>
+                  </a:lnTo>
+                  <a:lnTo>
+                    <a:pt x="1346521" y="3828325"/>
+                  </a:lnTo>
+                  <a:lnTo>
+                    <a:pt x="1262364" y="3867859"/>
+                  </a:lnTo>
+                  <a:lnTo>
+                    <a:pt x="1178206" y="3904788"/>
+                  </a:lnTo>
+                  <a:lnTo>
+                    <a:pt x="1094048" y="3939195"/>
+                  </a:lnTo>
+                  <a:lnTo>
+                    <a:pt x="1009891" y="3971175"/>
+                  </a:lnTo>
+                  <a:lnTo>
+                    <a:pt x="925733" y="4000835"/>
+                  </a:lnTo>
+                  <a:lnTo>
+                    <a:pt x="841576" y="4028289"/>
+                  </a:lnTo>
+                  <a:lnTo>
+                    <a:pt x="757418" y="4053655"/>
+                  </a:lnTo>
+                  <a:lnTo>
+                    <a:pt x="673260" y="4077053"/>
+                  </a:lnTo>
+                  <a:lnTo>
+                    <a:pt x="589103" y="4098606"/>
+                  </a:lnTo>
+                  <a:lnTo>
+                    <a:pt x="504945" y="4118430"/>
+                  </a:lnTo>
+                  <a:lnTo>
+                    <a:pt x="420788" y="4136644"/>
+                  </a:lnTo>
+                  <a:lnTo>
+                    <a:pt x="336630" y="4153358"/>
+                  </a:lnTo>
+                  <a:lnTo>
+                    <a:pt x="252472" y="4168682"/>
+                  </a:lnTo>
+                  <a:lnTo>
+                    <a:pt x="168315" y="4182718"/>
+                  </a:lnTo>
+                  <a:lnTo>
+                    <a:pt x="84157" y="4195563"/>
+                  </a:lnTo>
+                  <a:lnTo>
+                    <a:pt x="0" y="4207310"/>
                   </a:lnTo>
                   <a:close/>
                 </a:path>
@@ -3795,192 +3795,192 @@
           </p:nvSpPr>
           <p:spPr>
             <a:xfrm>
-              <a:off x="2199579" y="1774368"/>
-              <a:ext cx="5049456" cy="4143561"/>
+              <a:off x="2199579" y="1776739"/>
+              <a:ext cx="5049456" cy="4141130"/>
             </a:xfrm>
             <a:custGeom>
               <a:avLst/>
               <a:pathLst>
-                <a:path w="5049456" h="4143561">
+                <a:path w="5049456" h="4141130">
                   <a:moveTo>
-                    <a:pt x="0" y="4143561"/>
+                    <a:pt x="0" y="4141130"/>
                   </a:moveTo>
                   <a:lnTo>
-                    <a:pt x="84157" y="4128859"/>
-                  </a:lnTo>
-                  <a:lnTo>
-                    <a:pt x="168315" y="4113047"/>
-                  </a:lnTo>
-                  <a:lnTo>
-                    <a:pt x="252472" y="4096049"/>
-                  </a:lnTo>
-                  <a:lnTo>
-                    <a:pt x="336630" y="4077785"/>
-                  </a:lnTo>
-                  <a:lnTo>
-                    <a:pt x="420788" y="4058170"/>
-                  </a:lnTo>
-                  <a:lnTo>
-                    <a:pt x="504945" y="4037115"/>
-                  </a:lnTo>
-                  <a:lnTo>
-                    <a:pt x="589103" y="4014527"/>
-                  </a:lnTo>
-                  <a:lnTo>
-                    <a:pt x="673260" y="3990307"/>
-                  </a:lnTo>
-                  <a:lnTo>
-                    <a:pt x="757418" y="3964353"/>
-                  </a:lnTo>
-                  <a:lnTo>
-                    <a:pt x="841576" y="3936555"/>
-                  </a:lnTo>
-                  <a:lnTo>
-                    <a:pt x="925733" y="3906801"/>
-                  </a:lnTo>
-                  <a:lnTo>
-                    <a:pt x="1009891" y="3874971"/>
-                  </a:lnTo>
-                  <a:lnTo>
-                    <a:pt x="1094048" y="3840940"/>
-                  </a:lnTo>
-                  <a:lnTo>
-                    <a:pt x="1178206" y="3804574"/>
-                  </a:lnTo>
-                  <a:lnTo>
-                    <a:pt x="1262364" y="3765733"/>
-                  </a:lnTo>
-                  <a:lnTo>
-                    <a:pt x="1346521" y="3724271"/>
-                  </a:lnTo>
-                  <a:lnTo>
-                    <a:pt x="1430679" y="3680031"/>
-                  </a:lnTo>
-                  <a:lnTo>
-                    <a:pt x="1514837" y="3632850"/>
-                  </a:lnTo>
-                  <a:lnTo>
-                    <a:pt x="1598994" y="3582560"/>
-                  </a:lnTo>
-                  <a:lnTo>
-                    <a:pt x="1683152" y="3528992"/>
-                  </a:lnTo>
-                  <a:lnTo>
-                    <a:pt x="1767309" y="3471977"/>
-                  </a:lnTo>
-                  <a:lnTo>
-                    <a:pt x="1851467" y="3411361"/>
-                  </a:lnTo>
-                  <a:lnTo>
-                    <a:pt x="1935625" y="3347011"/>
-                  </a:lnTo>
-                  <a:lnTo>
-                    <a:pt x="2019782" y="3278826"/>
-                  </a:lnTo>
-                  <a:lnTo>
-                    <a:pt x="2103940" y="3206747"/>
-                  </a:lnTo>
-                  <a:lnTo>
-                    <a:pt x="2188097" y="3130761"/>
-                  </a:lnTo>
-                  <a:lnTo>
-                    <a:pt x="2272255" y="3050909"/>
-                  </a:lnTo>
-                  <a:lnTo>
-                    <a:pt x="2356413" y="2967280"/>
-                  </a:lnTo>
-                  <a:lnTo>
-                    <a:pt x="2440570" y="2880014"/>
-                  </a:lnTo>
-                  <a:lnTo>
-                    <a:pt x="2524728" y="2789293"/>
-                  </a:lnTo>
-                  <a:lnTo>
-                    <a:pt x="2608886" y="2695339"/>
-                  </a:lnTo>
-                  <a:lnTo>
-                    <a:pt x="2693043" y="2598405"/>
-                  </a:lnTo>
-                  <a:lnTo>
-                    <a:pt x="2777201" y="2498776"/>
-                  </a:lnTo>
-                  <a:lnTo>
-                    <a:pt x="2861358" y="2396759"/>
-                  </a:lnTo>
-                  <a:lnTo>
-                    <a:pt x="2945516" y="2292682"/>
-                  </a:lnTo>
-                  <a:lnTo>
-                    <a:pt x="3029674" y="2186887"/>
-                  </a:lnTo>
-                  <a:lnTo>
-                    <a:pt x="3113831" y="2079730"/>
-                  </a:lnTo>
-                  <a:lnTo>
-                    <a:pt x="3197989" y="1971573"/>
-                  </a:lnTo>
-                  <a:lnTo>
-                    <a:pt x="3282146" y="1862786"/>
-                  </a:lnTo>
-                  <a:lnTo>
-                    <a:pt x="3366304" y="1753742"/>
-                  </a:lnTo>
-                  <a:lnTo>
-                    <a:pt x="3450462" y="1644811"/>
-                  </a:lnTo>
-                  <a:lnTo>
-                    <a:pt x="3534619" y="1536366"/>
-                  </a:lnTo>
-                  <a:lnTo>
-                    <a:pt x="3618777" y="1428771"/>
-                  </a:lnTo>
-                  <a:lnTo>
-                    <a:pt x="3702934" y="1322385"/>
-                  </a:lnTo>
-                  <a:lnTo>
-                    <a:pt x="3787092" y="1217556"/>
-                  </a:lnTo>
-                  <a:lnTo>
-                    <a:pt x="3871250" y="1114618"/>
-                  </a:lnTo>
-                  <a:lnTo>
-                    <a:pt x="3955407" y="1013888"/>
-                  </a:lnTo>
-                  <a:lnTo>
-                    <a:pt x="4039565" y="915663"/>
-                  </a:lnTo>
-                  <a:lnTo>
-                    <a:pt x="4123723" y="820214"/>
-                  </a:lnTo>
-                  <a:lnTo>
-                    <a:pt x="4207880" y="727786"/>
-                  </a:lnTo>
-                  <a:lnTo>
-                    <a:pt x="4292038" y="638593"/>
-                  </a:lnTo>
-                  <a:lnTo>
-                    <a:pt x="4376195" y="552816"/>
-                  </a:lnTo>
-                  <a:lnTo>
-                    <a:pt x="4460353" y="470601"/>
-                  </a:lnTo>
-                  <a:lnTo>
-                    <a:pt x="4544511" y="392061"/>
-                  </a:lnTo>
-                  <a:lnTo>
-                    <a:pt x="4628668" y="317272"/>
-                  </a:lnTo>
-                  <a:lnTo>
-                    <a:pt x="4712826" y="246277"/>
-                  </a:lnTo>
-                  <a:lnTo>
-                    <a:pt x="4796983" y="179086"/>
-                  </a:lnTo>
-                  <a:lnTo>
-                    <a:pt x="4881141" y="115679"/>
-                  </a:lnTo>
-                  <a:lnTo>
-                    <a:pt x="4965299" y="56008"/>
+                    <a:pt x="84157" y="4126430"/>
+                  </a:lnTo>
+                  <a:lnTo>
+                    <a:pt x="168315" y="4110620"/>
+                  </a:lnTo>
+                  <a:lnTo>
+                    <a:pt x="252472" y="4093626"/>
+                  </a:lnTo>
+                  <a:lnTo>
+                    <a:pt x="336630" y="4075365"/>
+                  </a:lnTo>
+                  <a:lnTo>
+                    <a:pt x="420788" y="4055754"/>
+                  </a:lnTo>
+                  <a:lnTo>
+                    <a:pt x="504945" y="4034705"/>
+                  </a:lnTo>
+                  <a:lnTo>
+                    <a:pt x="589103" y="4012122"/>
+                  </a:lnTo>
+                  <a:lnTo>
+                    <a:pt x="673260" y="3987909"/>
+                  </a:lnTo>
+                  <a:lnTo>
+                    <a:pt x="757418" y="3961962"/>
+                  </a:lnTo>
+                  <a:lnTo>
+                    <a:pt x="841576" y="3934173"/>
+                  </a:lnTo>
+                  <a:lnTo>
+                    <a:pt x="925733" y="3904429"/>
+                  </a:lnTo>
+                  <a:lnTo>
+                    <a:pt x="1009891" y="3872608"/>
+                  </a:lnTo>
+                  <a:lnTo>
+                    <a:pt x="1094048" y="3838587"/>
+                  </a:lnTo>
+                  <a:lnTo>
+                    <a:pt x="1178206" y="3802231"/>
+                  </a:lnTo>
+                  <a:lnTo>
+                    <a:pt x="1262364" y="3763401"/>
+                  </a:lnTo>
+                  <a:lnTo>
+                    <a:pt x="1346521" y="3721950"/>
+                  </a:lnTo>
+                  <a:lnTo>
+                    <a:pt x="1430679" y="3677720"/>
+                  </a:lnTo>
+                  <a:lnTo>
+                    <a:pt x="1514837" y="3630550"/>
+                  </a:lnTo>
+                  <a:lnTo>
+                    <a:pt x="1598994" y="3580272"/>
+                  </a:lnTo>
+                  <a:lnTo>
+                    <a:pt x="1683152" y="3526714"/>
+                  </a:lnTo>
+                  <a:lnTo>
+                    <a:pt x="1767309" y="3469713"/>
+                  </a:lnTo>
+                  <a:lnTo>
+                    <a:pt x="1851467" y="3409113"/>
+                  </a:lnTo>
+                  <a:lnTo>
+                    <a:pt x="1935625" y="3344783"/>
+                  </a:lnTo>
+                  <a:lnTo>
+                    <a:pt x="2019782" y="3276625"/>
+                  </a:lnTo>
+                  <a:lnTo>
+                    <a:pt x="2103940" y="3204581"/>
+                  </a:lnTo>
+                  <a:lnTo>
+                    <a:pt x="2188097" y="3128641"/>
+                  </a:lnTo>
+                  <a:lnTo>
+                    <a:pt x="2272255" y="3048844"/>
+                  </a:lnTo>
+                  <a:lnTo>
+                    <a:pt x="2356413" y="2965284"/>
+                  </a:lnTo>
+                  <a:lnTo>
+                    <a:pt x="2440570" y="2878097"/>
+                  </a:lnTo>
+                  <a:lnTo>
+                    <a:pt x="2524728" y="2787467"/>
+                  </a:lnTo>
+                  <a:lnTo>
+                    <a:pt x="2608886" y="2693612"/>
+                  </a:lnTo>
+                  <a:lnTo>
+                    <a:pt x="2693043" y="2596787"/>
+                  </a:lnTo>
+                  <a:lnTo>
+                    <a:pt x="2777201" y="2497274"/>
+                  </a:lnTo>
+                  <a:lnTo>
+                    <a:pt x="2861358" y="2395379"/>
+                  </a:lnTo>
+                  <a:lnTo>
+                    <a:pt x="2945516" y="2291427"/>
+                  </a:lnTo>
+                  <a:lnTo>
+                    <a:pt x="3029674" y="2185760"/>
+                  </a:lnTo>
+                  <a:lnTo>
+                    <a:pt x="3113831" y="2078731"/>
+                  </a:lnTo>
+                  <a:lnTo>
+                    <a:pt x="3197989" y="1970703"/>
+                  </a:lnTo>
+                  <a:lnTo>
+                    <a:pt x="3282146" y="1862043"/>
+                  </a:lnTo>
+                  <a:lnTo>
+                    <a:pt x="3366304" y="1753123"/>
+                  </a:lnTo>
+                  <a:lnTo>
+                    <a:pt x="3450462" y="1644312"/>
+                  </a:lnTo>
+                  <a:lnTo>
+                    <a:pt x="3534619" y="1535981"/>
+                  </a:lnTo>
+                  <a:lnTo>
+                    <a:pt x="3618777" y="1428495"/>
+                  </a:lnTo>
+                  <a:lnTo>
+                    <a:pt x="3702934" y="1322211"/>
+                  </a:lnTo>
+                  <a:lnTo>
+                    <a:pt x="3787092" y="1217475"/>
+                  </a:lnTo>
+                  <a:lnTo>
+                    <a:pt x="3871250" y="1114621"/>
+                  </a:lnTo>
+                  <a:lnTo>
+                    <a:pt x="3955407" y="1013965"/>
+                  </a:lnTo>
+                  <a:lnTo>
+                    <a:pt x="4039565" y="915803"/>
+                  </a:lnTo>
+                  <a:lnTo>
+                    <a:pt x="4123723" y="820407"/>
+                  </a:lnTo>
+                  <a:lnTo>
+                    <a:pt x="4207880" y="728019"/>
+                  </a:lnTo>
+                  <a:lnTo>
+                    <a:pt x="4292038" y="638853"/>
+                  </a:lnTo>
+                  <a:lnTo>
+                    <a:pt x="4376195" y="553092"/>
+                  </a:lnTo>
+                  <a:lnTo>
+                    <a:pt x="4460353" y="470880"/>
+                  </a:lnTo>
+                  <a:lnTo>
+                    <a:pt x="4544511" y="392331"/>
+                  </a:lnTo>
+                  <a:lnTo>
+                    <a:pt x="4628668" y="317522"/>
+                  </a:lnTo>
+                  <a:lnTo>
+                    <a:pt x="4712826" y="246495"/>
+                  </a:lnTo>
+                  <a:lnTo>
+                    <a:pt x="4796983" y="179263"/>
+                  </a:lnTo>
+                  <a:lnTo>
+                    <a:pt x="4881141" y="115804"/>
+                  </a:lnTo>
+                  <a:lnTo>
+                    <a:pt x="4965299" y="56074"/>
                   </a:lnTo>
                   <a:lnTo>
                     <a:pt x="5049456" y="0"/>
@@ -4006,13 +4006,13 @@
           </p:nvSpPr>
           <p:spPr>
             <a:xfrm>
-              <a:off x="2199579" y="2264310"/>
-              <a:ext cx="5049456" cy="3720289"/>
+              <a:off x="2199579" y="2264815"/>
+              <a:ext cx="5049456" cy="3719235"/>
             </a:xfrm>
             <a:custGeom>
               <a:avLst/>
               <a:pathLst>
-                <a:path w="5049456" h="3720289">
+                <a:path w="5049456" h="3719235">
                   <a:moveTo>
                     <a:pt x="5049456" y="0"/>
                   </a:moveTo>
@@ -4020,187 +4020,187 @@
                     <a:pt x="5049456" y="0"/>
                   </a:lnTo>
                   <a:lnTo>
-                    <a:pt x="4965299" y="67815"/>
-                  </a:lnTo>
-                  <a:lnTo>
-                    <a:pt x="4881141" y="138054"/>
-                  </a:lnTo>
-                  <a:lnTo>
-                    <a:pt x="4796983" y="210642"/>
+                    <a:pt x="4965299" y="67816"/>
+                  </a:lnTo>
+                  <a:lnTo>
+                    <a:pt x="4881141" y="138055"/>
+                  </a:lnTo>
+                  <a:lnTo>
+                    <a:pt x="4796983" y="210643"/>
                   </a:lnTo>
                   <a:lnTo>
                     <a:pt x="4712826" y="285492"/>
                   </a:lnTo>
                   <a:lnTo>
-                    <a:pt x="4628668" y="362499"/>
-                  </a:lnTo>
-                  <a:lnTo>
-                    <a:pt x="4544511" y="441546"/>
-                  </a:lnTo>
-                  <a:lnTo>
-                    <a:pt x="4460353" y="522502"/>
-                  </a:lnTo>
-                  <a:lnTo>
-                    <a:pt x="4376195" y="605224"/>
-                  </a:lnTo>
-                  <a:lnTo>
-                    <a:pt x="4292038" y="689559"/>
-                  </a:lnTo>
-                  <a:lnTo>
-                    <a:pt x="4207880" y="775344"/>
-                  </a:lnTo>
-                  <a:lnTo>
-                    <a:pt x="4123723" y="862409"/>
-                  </a:lnTo>
-                  <a:lnTo>
-                    <a:pt x="4039565" y="950574"/>
-                  </a:lnTo>
-                  <a:lnTo>
-                    <a:pt x="3955407" y="1039658"/>
-                  </a:lnTo>
-                  <a:lnTo>
-                    <a:pt x="3871250" y="1129473"/>
-                  </a:lnTo>
-                  <a:lnTo>
-                    <a:pt x="3787092" y="1219828"/>
-                  </a:lnTo>
-                  <a:lnTo>
-                    <a:pt x="3702934" y="1310530"/>
-                  </a:lnTo>
-                  <a:lnTo>
-                    <a:pt x="3618777" y="1401387"/>
-                  </a:lnTo>
-                  <a:lnTo>
-                    <a:pt x="3534619" y="1492203"/>
-                  </a:lnTo>
-                  <a:lnTo>
-                    <a:pt x="3450462" y="1582788"/>
-                  </a:lnTo>
-                  <a:lnTo>
-                    <a:pt x="3366304" y="1672949"/>
-                  </a:lnTo>
-                  <a:lnTo>
-                    <a:pt x="3282146" y="1762500"/>
-                  </a:lnTo>
-                  <a:lnTo>
-                    <a:pt x="3197989" y="1851258"/>
-                  </a:lnTo>
-                  <a:lnTo>
-                    <a:pt x="3113831" y="1939044"/>
-                  </a:lnTo>
-                  <a:lnTo>
-                    <a:pt x="3029674" y="2025688"/>
-                  </a:lnTo>
-                  <a:lnTo>
-                    <a:pt x="2945516" y="2111027"/>
-                  </a:lnTo>
-                  <a:lnTo>
-                    <a:pt x="2861358" y="2194907"/>
-                  </a:lnTo>
-                  <a:lnTo>
-                    <a:pt x="2777201" y="2277187"/>
-                  </a:lnTo>
-                  <a:lnTo>
-                    <a:pt x="2693043" y="2357737"/>
-                  </a:lnTo>
-                  <a:lnTo>
-                    <a:pt x="2608886" y="2436438"/>
-                  </a:lnTo>
-                  <a:lnTo>
-                    <a:pt x="2524728" y="2513187"/>
-                  </a:lnTo>
-                  <a:lnTo>
-                    <a:pt x="2440570" y="2587891"/>
-                  </a:lnTo>
-                  <a:lnTo>
-                    <a:pt x="2356413" y="2660469"/>
-                  </a:lnTo>
-                  <a:lnTo>
-                    <a:pt x="2272255" y="2730849"/>
-                  </a:lnTo>
-                  <a:lnTo>
-                    <a:pt x="2188097" y="2798965"/>
-                  </a:lnTo>
-                  <a:lnTo>
-                    <a:pt x="2103940" y="2864750"/>
-                  </a:lnTo>
-                  <a:lnTo>
-                    <a:pt x="2019782" y="2928140"/>
-                  </a:lnTo>
-                  <a:lnTo>
-                    <a:pt x="1935625" y="2989067"/>
-                  </a:lnTo>
-                  <a:lnTo>
-                    <a:pt x="1851467" y="3047459"/>
-                  </a:lnTo>
-                  <a:lnTo>
-                    <a:pt x="1767309" y="3103249"/>
-                  </a:lnTo>
-                  <a:lnTo>
-                    <a:pt x="1683152" y="3156376"/>
-                  </a:lnTo>
-                  <a:lnTo>
-                    <a:pt x="1598994" y="3206794"/>
-                  </a:lnTo>
-                  <a:lnTo>
-                    <a:pt x="1514837" y="3254475"/>
-                  </a:lnTo>
-                  <a:lnTo>
-                    <a:pt x="1430679" y="3299415"/>
-                  </a:lnTo>
-                  <a:lnTo>
-                    <a:pt x="1346521" y="3341636"/>
-                  </a:lnTo>
-                  <a:lnTo>
-                    <a:pt x="1262364" y="3381179"/>
-                  </a:lnTo>
-                  <a:lnTo>
-                    <a:pt x="1178206" y="3418111"/>
-                  </a:lnTo>
-                  <a:lnTo>
-                    <a:pt x="1094048" y="3452513"/>
-                  </a:lnTo>
-                  <a:lnTo>
-                    <a:pt x="1009891" y="3484482"/>
-                  </a:lnTo>
-                  <a:lnTo>
-                    <a:pt x="925733" y="3514127"/>
-                  </a:lnTo>
-                  <a:lnTo>
-                    <a:pt x="841576" y="3541561"/>
-                  </a:lnTo>
-                  <a:lnTo>
-                    <a:pt x="757418" y="3566903"/>
-                  </a:lnTo>
-                  <a:lnTo>
-                    <a:pt x="673260" y="3590276"/>
-                  </a:lnTo>
-                  <a:lnTo>
-                    <a:pt x="589103" y="3611800"/>
-                  </a:lnTo>
-                  <a:lnTo>
-                    <a:pt x="504945" y="3631596"/>
-                  </a:lnTo>
-                  <a:lnTo>
-                    <a:pt x="420788" y="3649778"/>
-                  </a:lnTo>
-                  <a:lnTo>
-                    <a:pt x="336630" y="3666462"/>
-                  </a:lnTo>
-                  <a:lnTo>
-                    <a:pt x="252472" y="3681754"/>
-                  </a:lnTo>
-                  <a:lnTo>
-                    <a:pt x="168315" y="3695759"/>
-                  </a:lnTo>
-                  <a:lnTo>
-                    <a:pt x="84157" y="3708573"/>
-                  </a:lnTo>
-                  <a:lnTo>
-                    <a:pt x="0" y="3720289"/>
-                  </a:lnTo>
-                  <a:lnTo>
-                    <a:pt x="0" y="3720289"/>
+                    <a:pt x="4628668" y="362498"/>
+                  </a:lnTo>
+                  <a:lnTo>
+                    <a:pt x="4544511" y="441543"/>
+                  </a:lnTo>
+                  <a:lnTo>
+                    <a:pt x="4460353" y="522497"/>
+                  </a:lnTo>
+                  <a:lnTo>
+                    <a:pt x="4376195" y="605216"/>
+                  </a:lnTo>
+                  <a:lnTo>
+                    <a:pt x="4292038" y="689549"/>
+                  </a:lnTo>
+                  <a:lnTo>
+                    <a:pt x="4207880" y="775330"/>
+                  </a:lnTo>
+                  <a:lnTo>
+                    <a:pt x="4123723" y="862391"/>
+                  </a:lnTo>
+                  <a:lnTo>
+                    <a:pt x="4039565" y="950552"/>
+                  </a:lnTo>
+                  <a:lnTo>
+                    <a:pt x="3955407" y="1039630"/>
+                  </a:lnTo>
+                  <a:lnTo>
+                    <a:pt x="3871250" y="1129438"/>
+                  </a:lnTo>
+                  <a:lnTo>
+                    <a:pt x="3787092" y="1219785"/>
+                  </a:lnTo>
+                  <a:lnTo>
+                    <a:pt x="3702934" y="1310478"/>
+                  </a:lnTo>
+                  <a:lnTo>
+                    <a:pt x="3618777" y="1401322"/>
+                  </a:lnTo>
+                  <a:lnTo>
+                    <a:pt x="3534619" y="1492125"/>
+                  </a:lnTo>
+                  <a:lnTo>
+                    <a:pt x="3450462" y="1582692"/>
+                  </a:lnTo>
+                  <a:lnTo>
+                    <a:pt x="3366304" y="1672834"/>
+                  </a:lnTo>
+                  <a:lnTo>
+                    <a:pt x="3282146" y="1762362"/>
+                  </a:lnTo>
+                  <a:lnTo>
+                    <a:pt x="3197989" y="1851093"/>
+                  </a:lnTo>
+                  <a:lnTo>
+                    <a:pt x="3113831" y="1938848"/>
+                  </a:lnTo>
+                  <a:lnTo>
+                    <a:pt x="3029674" y="2025457"/>
+                  </a:lnTo>
+                  <a:lnTo>
+                    <a:pt x="2945516" y="2110757"/>
+                  </a:lnTo>
+                  <a:lnTo>
+                    <a:pt x="2861358" y="2194594"/>
+                  </a:lnTo>
+                  <a:lnTo>
+                    <a:pt x="2777201" y="2276826"/>
+                  </a:lnTo>
+                  <a:lnTo>
+                    <a:pt x="2693043" y="2357322"/>
+                  </a:lnTo>
+                  <a:lnTo>
+                    <a:pt x="2608886" y="2435965"/>
+                  </a:lnTo>
+                  <a:lnTo>
+                    <a:pt x="2524728" y="2512651"/>
+                  </a:lnTo>
+                  <a:lnTo>
+                    <a:pt x="2440570" y="2587287"/>
+                  </a:lnTo>
+                  <a:lnTo>
+                    <a:pt x="2356413" y="2659794"/>
+                  </a:lnTo>
+                  <a:lnTo>
+                    <a:pt x="2272255" y="2730098"/>
+                  </a:lnTo>
+                  <a:lnTo>
+                    <a:pt x="2188097" y="2798135"/>
+                  </a:lnTo>
+                  <a:lnTo>
+                    <a:pt x="2103940" y="2863841"/>
+                  </a:lnTo>
+                  <a:lnTo>
+                    <a:pt x="2019782" y="2927152"/>
+                  </a:lnTo>
+                  <a:lnTo>
+                    <a:pt x="1935625" y="2988002"/>
+                  </a:lnTo>
+                  <a:lnTo>
+                    <a:pt x="1851467" y="3046323"/>
+                  </a:lnTo>
+                  <a:lnTo>
+                    <a:pt x="1767309" y="3102048"/>
+                  </a:lnTo>
+                  <a:lnTo>
+                    <a:pt x="1683152" y="3155119"/>
+                  </a:lnTo>
+                  <a:lnTo>
+                    <a:pt x="1598994" y="3205490"/>
+                  </a:lnTo>
+                  <a:lnTo>
+                    <a:pt x="1514837" y="3253134"/>
+                  </a:lnTo>
+                  <a:lnTo>
+                    <a:pt x="1430679" y="3298047"/>
+                  </a:lnTo>
+                  <a:lnTo>
+                    <a:pt x="1346521" y="3340249"/>
+                  </a:lnTo>
+                  <a:lnTo>
+                    <a:pt x="1262364" y="3379783"/>
+                  </a:lnTo>
+                  <a:lnTo>
+                    <a:pt x="1178206" y="3416713"/>
+                  </a:lnTo>
+                  <a:lnTo>
+                    <a:pt x="1094048" y="3451120"/>
+                  </a:lnTo>
+                  <a:lnTo>
+                    <a:pt x="1009891" y="3483100"/>
+                  </a:lnTo>
+                  <a:lnTo>
+                    <a:pt x="925733" y="3512760"/>
+                  </a:lnTo>
+                  <a:lnTo>
+                    <a:pt x="841576" y="3540213"/>
+                  </a:lnTo>
+                  <a:lnTo>
+                    <a:pt x="757418" y="3565579"/>
+                  </a:lnTo>
+                  <a:lnTo>
+                    <a:pt x="673260" y="3588978"/>
+                  </a:lnTo>
+                  <a:lnTo>
+                    <a:pt x="589103" y="3610530"/>
+                  </a:lnTo>
+                  <a:lnTo>
+                    <a:pt x="504945" y="3630355"/>
+                  </a:lnTo>
+                  <a:lnTo>
+                    <a:pt x="420788" y="3648568"/>
+                  </a:lnTo>
+                  <a:lnTo>
+                    <a:pt x="336630" y="3665283"/>
+                  </a:lnTo>
+                  <a:lnTo>
+                    <a:pt x="252472" y="3680606"/>
+                  </a:lnTo>
+                  <a:lnTo>
+                    <a:pt x="168315" y="3694642"/>
+                  </a:lnTo>
+                  <a:lnTo>
+                    <a:pt x="84157" y="3707488"/>
+                  </a:lnTo>
+                  <a:lnTo>
+                    <a:pt x="0" y="3719235"/>
+                  </a:lnTo>
+                  <a:lnTo>
+                    <a:pt x="0" y="3719235"/>
                   </a:lnTo>
                 </a:path>
               </a:pathLst>
@@ -4220,192 +4220,192 @@
           </p:nvSpPr>
           <p:spPr>
             <a:xfrm>
-              <a:off x="2199579" y="1994539"/>
-              <a:ext cx="5049456" cy="3960265"/>
+              <a:off x="2199579" y="1996221"/>
+              <a:ext cx="5049456" cy="3958218"/>
             </a:xfrm>
             <a:custGeom>
               <a:avLst/>
               <a:pathLst>
-                <a:path w="5049456" h="3960265">
+                <a:path w="5049456" h="3958218">
                   <a:moveTo>
-                    <a:pt x="0" y="3960265"/>
+                    <a:pt x="0" y="3958218"/>
                   </a:moveTo>
                   <a:lnTo>
-                    <a:pt x="84157" y="3947056"/>
-                  </a:lnTo>
-                  <a:lnTo>
-                    <a:pt x="168315" y="3932732"/>
-                  </a:lnTo>
-                  <a:lnTo>
-                    <a:pt x="252472" y="3917206"/>
-                  </a:lnTo>
-                  <a:lnTo>
-                    <a:pt x="336630" y="3900391"/>
-                  </a:lnTo>
-                  <a:lnTo>
-                    <a:pt x="420788" y="3882191"/>
-                  </a:lnTo>
-                  <a:lnTo>
-                    <a:pt x="504945" y="3862509"/>
-                  </a:lnTo>
-                  <a:lnTo>
-                    <a:pt x="589103" y="3841241"/>
-                  </a:lnTo>
-                  <a:lnTo>
-                    <a:pt x="673260" y="3818280"/>
-                  </a:lnTo>
-                  <a:lnTo>
-                    <a:pt x="757418" y="3793516"/>
-                  </a:lnTo>
-                  <a:lnTo>
-                    <a:pt x="841576" y="3766836"/>
-                  </a:lnTo>
-                  <a:lnTo>
-                    <a:pt x="925733" y="3738123"/>
-                  </a:lnTo>
-                  <a:lnTo>
-                    <a:pt x="1009891" y="3707261"/>
-                  </a:lnTo>
-                  <a:lnTo>
-                    <a:pt x="1094048" y="3674131"/>
-                  </a:lnTo>
-                  <a:lnTo>
-                    <a:pt x="1178206" y="3638615"/>
-                  </a:lnTo>
-                  <a:lnTo>
-                    <a:pt x="1262364" y="3600600"/>
-                  </a:lnTo>
-                  <a:lnTo>
-                    <a:pt x="1346521" y="3559972"/>
-                  </a:lnTo>
-                  <a:lnTo>
-                    <a:pt x="1430679" y="3516625"/>
-                  </a:lnTo>
-                  <a:lnTo>
-                    <a:pt x="1514837" y="3470458"/>
-                  </a:lnTo>
-                  <a:lnTo>
-                    <a:pt x="1598994" y="3421382"/>
-                  </a:lnTo>
-                  <a:lnTo>
-                    <a:pt x="1683152" y="3369315"/>
-                  </a:lnTo>
-                  <a:lnTo>
-                    <a:pt x="1767309" y="3314191"/>
-                  </a:lnTo>
-                  <a:lnTo>
-                    <a:pt x="1851467" y="3255956"/>
-                  </a:lnTo>
-                  <a:lnTo>
-                    <a:pt x="1935625" y="3194576"/>
-                  </a:lnTo>
-                  <a:lnTo>
-                    <a:pt x="2019782" y="3130034"/>
-                  </a:lnTo>
-                  <a:lnTo>
-                    <a:pt x="2103940" y="3062335"/>
-                  </a:lnTo>
-                  <a:lnTo>
-                    <a:pt x="2188097" y="2991503"/>
-                  </a:lnTo>
-                  <a:lnTo>
-                    <a:pt x="2272255" y="2917588"/>
-                  </a:lnTo>
-                  <a:lnTo>
-                    <a:pt x="2356413" y="2840663"/>
-                  </a:lnTo>
-                  <a:lnTo>
-                    <a:pt x="2440570" y="2760824"/>
-                  </a:lnTo>
-                  <a:lnTo>
-                    <a:pt x="2524728" y="2678190"/>
-                  </a:lnTo>
-                  <a:lnTo>
-                    <a:pt x="2608886" y="2592905"/>
-                  </a:lnTo>
-                  <a:lnTo>
-                    <a:pt x="2693043" y="2505133"/>
-                  </a:lnTo>
-                  <a:lnTo>
-                    <a:pt x="2777201" y="2415058"/>
-                  </a:lnTo>
-                  <a:lnTo>
-                    <a:pt x="2861358" y="2322884"/>
-                  </a:lnTo>
-                  <a:lnTo>
-                    <a:pt x="2945516" y="2228829"/>
-                  </a:lnTo>
-                  <a:lnTo>
-                    <a:pt x="3029674" y="2133127"/>
-                  </a:lnTo>
-                  <a:lnTo>
-                    <a:pt x="3113831" y="2036023"/>
-                  </a:lnTo>
-                  <a:lnTo>
-                    <a:pt x="3197989" y="1937771"/>
-                  </a:lnTo>
-                  <a:lnTo>
-                    <a:pt x="3282146" y="1838632"/>
-                  </a:lnTo>
-                  <a:lnTo>
-                    <a:pt x="3366304" y="1738875"/>
-                  </a:lnTo>
-                  <a:lnTo>
-                    <a:pt x="3450462" y="1638770"/>
-                  </a:lnTo>
-                  <a:lnTo>
-                    <a:pt x="3534619" y="1538591"/>
-                  </a:lnTo>
-                  <a:lnTo>
-                    <a:pt x="3618777" y="1438610"/>
-                  </a:lnTo>
-                  <a:lnTo>
-                    <a:pt x="3702934" y="1339100"/>
-                  </a:lnTo>
-                  <a:lnTo>
-                    <a:pt x="3787092" y="1240331"/>
-                  </a:lnTo>
-                  <a:lnTo>
-                    <a:pt x="3871250" y="1142568"/>
-                  </a:lnTo>
-                  <a:lnTo>
-                    <a:pt x="3955407" y="1046070"/>
-                  </a:lnTo>
-                  <a:lnTo>
-                    <a:pt x="4039565" y="951086"/>
-                  </a:lnTo>
-                  <a:lnTo>
-                    <a:pt x="4123723" y="857857"/>
-                  </a:lnTo>
-                  <a:lnTo>
-                    <a:pt x="4207880" y="766609"/>
-                  </a:lnTo>
-                  <a:lnTo>
-                    <a:pt x="4292038" y="677556"/>
-                  </a:lnTo>
-                  <a:lnTo>
-                    <a:pt x="4376195" y="590891"/>
-                  </a:lnTo>
-                  <a:lnTo>
-                    <a:pt x="4460353" y="506790"/>
-                  </a:lnTo>
-                  <a:lnTo>
-                    <a:pt x="4544511" y="425409"/>
-                  </a:lnTo>
-                  <a:lnTo>
-                    <a:pt x="4628668" y="346879"/>
-                  </a:lnTo>
-                  <a:lnTo>
-                    <a:pt x="4712826" y="271310"/>
-                  </a:lnTo>
-                  <a:lnTo>
-                    <a:pt x="4796983" y="198788"/>
-                  </a:lnTo>
-                  <a:lnTo>
-                    <a:pt x="4881141" y="129373"/>
-                  </a:lnTo>
-                  <a:lnTo>
-                    <a:pt x="4965299" y="63105"/>
+                    <a:pt x="84157" y="3944994"/>
+                  </a:lnTo>
+                  <a:lnTo>
+                    <a:pt x="168315" y="3930654"/>
+                  </a:lnTo>
+                  <a:lnTo>
+                    <a:pt x="252472" y="3915115"/>
+                  </a:lnTo>
+                  <a:lnTo>
+                    <a:pt x="336630" y="3898285"/>
+                  </a:lnTo>
+                  <a:lnTo>
+                    <a:pt x="420788" y="3880072"/>
+                  </a:lnTo>
+                  <a:lnTo>
+                    <a:pt x="504945" y="3860378"/>
+                  </a:lnTo>
+                  <a:lnTo>
+                    <a:pt x="589103" y="3839099"/>
+                  </a:lnTo>
+                  <a:lnTo>
+                    <a:pt x="673260" y="3816128"/>
+                  </a:lnTo>
+                  <a:lnTo>
+                    <a:pt x="757418" y="3791357"/>
+                  </a:lnTo>
+                  <a:lnTo>
+                    <a:pt x="841576" y="3764671"/>
+                  </a:lnTo>
+                  <a:lnTo>
+                    <a:pt x="925733" y="3735955"/>
+                  </a:lnTo>
+                  <a:lnTo>
+                    <a:pt x="1009891" y="3705092"/>
+                  </a:lnTo>
+                  <a:lnTo>
+                    <a:pt x="1094048" y="3671964"/>
+                  </a:lnTo>
+                  <a:lnTo>
+                    <a:pt x="1178206" y="3636454"/>
+                  </a:lnTo>
+                  <a:lnTo>
+                    <a:pt x="1262364" y="3598448"/>
+                  </a:lnTo>
+                  <a:lnTo>
+                    <a:pt x="1346521" y="3557833"/>
+                  </a:lnTo>
+                  <a:lnTo>
+                    <a:pt x="1430679" y="3514504"/>
+                  </a:lnTo>
+                  <a:lnTo>
+                    <a:pt x="1514837" y="3468360"/>
+                  </a:lnTo>
+                  <a:lnTo>
+                    <a:pt x="1598994" y="3419311"/>
+                  </a:lnTo>
+                  <a:lnTo>
+                    <a:pt x="1683152" y="3367277"/>
+                  </a:lnTo>
+                  <a:lnTo>
+                    <a:pt x="1767309" y="3312190"/>
+                  </a:lnTo>
+                  <a:lnTo>
+                    <a:pt x="1851467" y="3253998"/>
+                  </a:lnTo>
+                  <a:lnTo>
+                    <a:pt x="1935625" y="3192667"/>
+                  </a:lnTo>
+                  <a:lnTo>
+                    <a:pt x="2019782" y="3128179"/>
+                  </a:lnTo>
+                  <a:lnTo>
+                    <a:pt x="2103940" y="3060538"/>
+                  </a:lnTo>
+                  <a:lnTo>
+                    <a:pt x="2188097" y="2989771"/>
+                  </a:lnTo>
+                  <a:lnTo>
+                    <a:pt x="2272255" y="2915924"/>
+                  </a:lnTo>
+                  <a:lnTo>
+                    <a:pt x="2356413" y="2839072"/>
+                  </a:lnTo>
+                  <a:lnTo>
+                    <a:pt x="2440570" y="2759309"/>
+                  </a:lnTo>
+                  <a:lnTo>
+                    <a:pt x="2524728" y="2676755"/>
+                  </a:lnTo>
+                  <a:lnTo>
+                    <a:pt x="2608886" y="2591551"/>
+                  </a:lnTo>
+                  <a:lnTo>
+                    <a:pt x="2693043" y="2503863"/>
+                  </a:lnTo>
+                  <a:lnTo>
+                    <a:pt x="2777201" y="2413873"/>
+                  </a:lnTo>
+                  <a:lnTo>
+                    <a:pt x="2861358" y="2321784"/>
+                  </a:lnTo>
+                  <a:lnTo>
+                    <a:pt x="2945516" y="2227815"/>
+                  </a:lnTo>
+                  <a:lnTo>
+                    <a:pt x="3029674" y="2132197"/>
+                  </a:lnTo>
+                  <a:lnTo>
+                    <a:pt x="3113831" y="2035176"/>
+                  </a:lnTo>
+                  <a:lnTo>
+                    <a:pt x="3197989" y="1937005"/>
+                  </a:lnTo>
+                  <a:lnTo>
+                    <a:pt x="3282146" y="1837946"/>
+                  </a:lnTo>
+                  <a:lnTo>
+                    <a:pt x="3366304" y="1738266"/>
+                  </a:lnTo>
+                  <a:lnTo>
+                    <a:pt x="3450462" y="1638235"/>
+                  </a:lnTo>
+                  <a:lnTo>
+                    <a:pt x="3534619" y="1538126"/>
+                  </a:lnTo>
+                  <a:lnTo>
+                    <a:pt x="3618777" y="1438213"/>
+                  </a:lnTo>
+                  <a:lnTo>
+                    <a:pt x="3702934" y="1338767"/>
+                  </a:lnTo>
+                  <a:lnTo>
+                    <a:pt x="3787092" y="1240058"/>
+                  </a:lnTo>
+                  <a:lnTo>
+                    <a:pt x="3871250" y="1142350"/>
+                  </a:lnTo>
+                  <a:lnTo>
+                    <a:pt x="3955407" y="1045903"/>
+                  </a:lnTo>
+                  <a:lnTo>
+                    <a:pt x="4039565" y="950966"/>
+                  </a:lnTo>
+                  <a:lnTo>
+                    <a:pt x="4123723" y="857779"/>
+                  </a:lnTo>
+                  <a:lnTo>
+                    <a:pt x="4207880" y="766568"/>
+                  </a:lnTo>
+                  <a:lnTo>
+                    <a:pt x="4292038" y="677546"/>
+                  </a:lnTo>
+                  <a:lnTo>
+                    <a:pt x="4376195" y="590906"/>
+                  </a:lnTo>
+                  <a:lnTo>
+                    <a:pt x="4460353" y="506825"/>
+                  </a:lnTo>
+                  <a:lnTo>
+                    <a:pt x="4544511" y="425456"/>
+                  </a:lnTo>
+                  <a:lnTo>
+                    <a:pt x="4628668" y="346934"/>
+                  </a:lnTo>
+                  <a:lnTo>
+                    <a:pt x="4712826" y="271365"/>
+                  </a:lnTo>
+                  <a:lnTo>
+                    <a:pt x="4796983" y="198838"/>
+                  </a:lnTo>
+                  <a:lnTo>
+                    <a:pt x="4881141" y="129412"/>
+                  </a:lnTo>
+                  <a:lnTo>
+                    <a:pt x="4965299" y="63127"/>
                   </a:lnTo>
                   <a:lnTo>
                     <a:pt x="5049456" y="0"/>

</xml_diff>

<commit_message>
Updated fits & plots international data
</commit_message>
<xml_diff>
--- a/plots/2021_02_09/Fig4_fit1_binomGLMM_B117_Belgium_response scale.pptx
+++ b/plots/2021_02_09/Fig4_fit1_binomGLMM_B117_Belgium_response scale.pptx
@@ -3806,6 +3806,9 @@
                     <a:pt x="0" y="4141130"/>
                   </a:moveTo>
                   <a:lnTo>
+                    <a:pt x="0" y="4141130"/>
+                  </a:lnTo>
+                  <a:lnTo>
                     <a:pt x="84157" y="4126430"/>
                   </a:lnTo>
                   <a:lnTo>
@@ -4230,6 +4233,9 @@
                   <a:moveTo>
                     <a:pt x="0" y="3958218"/>
                   </a:moveTo>
+                  <a:lnTo>
+                    <a:pt x="0" y="3958218"/>
+                  </a:lnTo>
                   <a:lnTo>
                     <a:pt x="84157" y="3944994"/>
                   </a:lnTo>

</xml_diff>